<commit_message>
Completed first draft of the manuscript
</commit_message>
<xml_diff>
--- a/Manuscript/Figures/04_Results_ECDF.pptx
+++ b/Manuscript/Figures/04_Results_ECDF.pptx
@@ -115,13 +115,429 @@
 <file path=ppt/revisionInfo.xml><?xml version="1.0" encoding="utf-8"?>
 <p1510:revInfo xmlns:a="http://schemas.openxmlformats.org/drawingml/2006/main" xmlns:r="http://schemas.openxmlformats.org/officeDocument/2006/relationships" xmlns:p1510="http://schemas.microsoft.com/office/powerpoint/2015/10/main">
   <p1510:revLst>
-    <p1510:client id="{47DCB951-EA53-4157-9AD3-C351E4E0652B}" v="8" dt="2024-10-02T13:11:30.388"/>
+    <p1510:client id="{522B8EA6-2481-4C46-B3A5-6264BF778CA1}" v="20" dt="2024-10-09T16:12:02.716"/>
   </p1510:revLst>
 </p1510:revInfo>
 </file>
 
 <file path=ppt/changesInfos/changesInfo1.xml><?xml version="1.0" encoding="utf-8"?>
 <pc:chgInfo xmlns:a="http://schemas.openxmlformats.org/drawingml/2006/main" xmlns:r="http://schemas.openxmlformats.org/officeDocument/2006/relationships" xmlns:ac="http://schemas.microsoft.com/office/drawing/2013/main/command" xmlns:pc="http://schemas.microsoft.com/office/powerpoint/2013/main/command">
+  <pc:docChgLst>
+    <pc:chgData name="Fatima Pillosu" userId="a6295d4dc9e22643" providerId="LiveId" clId="{522B8EA6-2481-4C46-B3A5-6264BF778CA1}"/>
+    <pc:docChg chg="undo custSel modSld">
+      <pc:chgData name="Fatima Pillosu" userId="a6295d4dc9e22643" providerId="LiveId" clId="{522B8EA6-2481-4C46-B3A5-6264BF778CA1}" dt="2024-10-09T16:55:06.980" v="506" actId="20577"/>
+      <pc:docMkLst>
+        <pc:docMk/>
+      </pc:docMkLst>
+      <pc:sldChg chg="addSp delSp modSp mod">
+        <pc:chgData name="Fatima Pillosu" userId="a6295d4dc9e22643" providerId="LiveId" clId="{522B8EA6-2481-4C46-B3A5-6264BF778CA1}" dt="2024-10-09T16:55:06.980" v="506" actId="20577"/>
+        <pc:sldMkLst>
+          <pc:docMk/>
+          <pc:sldMk cId="1951859862" sldId="258"/>
+        </pc:sldMkLst>
+        <pc:spChg chg="add mod">
+          <ac:chgData name="Fatima Pillosu" userId="a6295d4dc9e22643" providerId="LiveId" clId="{522B8EA6-2481-4C46-B3A5-6264BF778CA1}" dt="2024-10-09T15:54:07.317" v="114" actId="207"/>
+          <ac:spMkLst>
+            <pc:docMk/>
+            <pc:sldMk cId="1951859862" sldId="258"/>
+            <ac:spMk id="2" creationId="{7DC99155-5A73-0EDA-66CC-4D16BBE95418}"/>
+          </ac:spMkLst>
+        </pc:spChg>
+        <pc:spChg chg="add mod">
+          <ac:chgData name="Fatima Pillosu" userId="a6295d4dc9e22643" providerId="LiveId" clId="{522B8EA6-2481-4C46-B3A5-6264BF778CA1}" dt="2024-10-09T15:54:22.677" v="118" actId="14100"/>
+          <ac:spMkLst>
+            <pc:docMk/>
+            <pc:sldMk cId="1951859862" sldId="258"/>
+            <ac:spMk id="4" creationId="{A72162B1-E4A6-C2FA-C51F-ED8414816C83}"/>
+          </ac:spMkLst>
+        </pc:spChg>
+        <pc:spChg chg="add mod">
+          <ac:chgData name="Fatima Pillosu" userId="a6295d4dc9e22643" providerId="LiveId" clId="{522B8EA6-2481-4C46-B3A5-6264BF778CA1}" dt="2024-10-09T15:54:47.383" v="127" actId="1036"/>
+          <ac:spMkLst>
+            <pc:docMk/>
+            <pc:sldMk cId="1951859862" sldId="258"/>
+            <ac:spMk id="5" creationId="{8C135897-AF3D-0879-B7A8-8FD200B128AA}"/>
+          </ac:spMkLst>
+        </pc:spChg>
+        <pc:spChg chg="add mod">
+          <ac:chgData name="Fatima Pillosu" userId="a6295d4dc9e22643" providerId="LiveId" clId="{522B8EA6-2481-4C46-B3A5-6264BF778CA1}" dt="2024-10-09T15:54:47.383" v="127" actId="1036"/>
+          <ac:spMkLst>
+            <pc:docMk/>
+            <pc:sldMk cId="1951859862" sldId="258"/>
+            <ac:spMk id="6" creationId="{6A6A7F64-F7EB-8B6D-44C7-520307EB361D}"/>
+          </ac:spMkLst>
+        </pc:spChg>
+        <pc:spChg chg="add mod ord">
+          <ac:chgData name="Fatima Pillosu" userId="a6295d4dc9e22643" providerId="LiveId" clId="{522B8EA6-2481-4C46-B3A5-6264BF778CA1}" dt="2024-10-09T16:06:57.693" v="374" actId="1036"/>
+          <ac:spMkLst>
+            <pc:docMk/>
+            <pc:sldMk cId="1951859862" sldId="258"/>
+            <ac:spMk id="8" creationId="{BE642F91-41AB-927B-EF50-48E1023EBA61}"/>
+          </ac:spMkLst>
+        </pc:spChg>
+        <pc:spChg chg="add mod ord">
+          <ac:chgData name="Fatima Pillosu" userId="a6295d4dc9e22643" providerId="LiveId" clId="{522B8EA6-2481-4C46-B3A5-6264BF778CA1}" dt="2024-10-09T16:06:42.287" v="365" actId="1076"/>
+          <ac:spMkLst>
+            <pc:docMk/>
+            <pc:sldMk cId="1951859862" sldId="258"/>
+            <ac:spMk id="10" creationId="{778F6435-EB47-CA5B-0096-795D1557F15F}"/>
+          </ac:spMkLst>
+        </pc:spChg>
+        <pc:spChg chg="add del mod">
+          <ac:chgData name="Fatima Pillosu" userId="a6295d4dc9e22643" providerId="LiveId" clId="{522B8EA6-2481-4C46-B3A5-6264BF778CA1}" dt="2024-10-09T16:10:24.299" v="393" actId="21"/>
+          <ac:spMkLst>
+            <pc:docMk/>
+            <pc:sldMk cId="1951859862" sldId="258"/>
+            <ac:spMk id="12" creationId="{E410AEEC-2D65-D54F-BAEF-5C49AEEE50FE}"/>
+          </ac:spMkLst>
+        </pc:spChg>
+        <pc:spChg chg="add del mod">
+          <ac:chgData name="Fatima Pillosu" userId="a6295d4dc9e22643" providerId="LiveId" clId="{522B8EA6-2481-4C46-B3A5-6264BF778CA1}" dt="2024-10-09T16:12:01.562" v="415" actId="21"/>
+          <ac:spMkLst>
+            <pc:docMk/>
+            <pc:sldMk cId="1951859862" sldId="258"/>
+            <ac:spMk id="13" creationId="{12C4DF27-5A7D-5ECC-6792-E875BA82DE24}"/>
+          </ac:spMkLst>
+        </pc:spChg>
+        <pc:spChg chg="add mod">
+          <ac:chgData name="Fatima Pillosu" userId="a6295d4dc9e22643" providerId="LiveId" clId="{522B8EA6-2481-4C46-B3A5-6264BF778CA1}" dt="2024-10-09T15:56:23.150" v="163" actId="14100"/>
+          <ac:spMkLst>
+            <pc:docMk/>
+            <pc:sldMk cId="1951859862" sldId="258"/>
+            <ac:spMk id="14" creationId="{9F4E2625-1561-2C3B-DCD2-DE629ADF6E13}"/>
+          </ac:spMkLst>
+        </pc:spChg>
+        <pc:spChg chg="add mod">
+          <ac:chgData name="Fatima Pillosu" userId="a6295d4dc9e22643" providerId="LiveId" clId="{522B8EA6-2481-4C46-B3A5-6264BF778CA1}" dt="2024-10-09T15:56:54.696" v="171" actId="1038"/>
+          <ac:spMkLst>
+            <pc:docMk/>
+            <pc:sldMk cId="1951859862" sldId="258"/>
+            <ac:spMk id="15" creationId="{30759621-3477-5B18-711F-0C7E5B3202DF}"/>
+          </ac:spMkLst>
+        </pc:spChg>
+        <pc:spChg chg="add mod">
+          <ac:chgData name="Fatima Pillosu" userId="a6295d4dc9e22643" providerId="LiveId" clId="{522B8EA6-2481-4C46-B3A5-6264BF778CA1}" dt="2024-10-09T15:57:17.959" v="176" actId="1038"/>
+          <ac:spMkLst>
+            <pc:docMk/>
+            <pc:sldMk cId="1951859862" sldId="258"/>
+            <ac:spMk id="16" creationId="{B8FDFC28-E407-D5DD-6B87-8F20A353963E}"/>
+          </ac:spMkLst>
+        </pc:spChg>
+        <pc:spChg chg="add mod">
+          <ac:chgData name="Fatima Pillosu" userId="a6295d4dc9e22643" providerId="LiveId" clId="{522B8EA6-2481-4C46-B3A5-6264BF778CA1}" dt="2024-10-09T15:57:17.959" v="176" actId="1038"/>
+          <ac:spMkLst>
+            <pc:docMk/>
+            <pc:sldMk cId="1951859862" sldId="258"/>
+            <ac:spMk id="17" creationId="{6BBD607F-DACD-5A35-3323-892FB32059E4}"/>
+          </ac:spMkLst>
+        </pc:spChg>
+        <pc:spChg chg="add mod ord">
+          <ac:chgData name="Fatima Pillosu" userId="a6295d4dc9e22643" providerId="LiveId" clId="{522B8EA6-2481-4C46-B3A5-6264BF778CA1}" dt="2024-10-09T16:06:57.693" v="374" actId="1036"/>
+          <ac:spMkLst>
+            <pc:docMk/>
+            <pc:sldMk cId="1951859862" sldId="258"/>
+            <ac:spMk id="18" creationId="{BC523E81-E5EC-A949-C1BC-0F252AD3C865}"/>
+          </ac:spMkLst>
+        </pc:spChg>
+        <pc:spChg chg="add mod ord">
+          <ac:chgData name="Fatima Pillosu" userId="a6295d4dc9e22643" providerId="LiveId" clId="{522B8EA6-2481-4C46-B3A5-6264BF778CA1}" dt="2024-10-09T16:06:42.287" v="365" actId="1076"/>
+          <ac:spMkLst>
+            <pc:docMk/>
+            <pc:sldMk cId="1951859862" sldId="258"/>
+            <ac:spMk id="19" creationId="{B82656F1-DB4F-0344-B084-D416B5CA6227}"/>
+          </ac:spMkLst>
+        </pc:spChg>
+        <pc:spChg chg="add del mod">
+          <ac:chgData name="Fatima Pillosu" userId="a6295d4dc9e22643" providerId="LiveId" clId="{522B8EA6-2481-4C46-B3A5-6264BF778CA1}" dt="2024-10-09T16:10:24.299" v="393" actId="21"/>
+          <ac:spMkLst>
+            <pc:docMk/>
+            <pc:sldMk cId="1951859862" sldId="258"/>
+            <ac:spMk id="20" creationId="{81B45D24-4A67-3E7C-6EF7-08BCAD5FEE72}"/>
+          </ac:spMkLst>
+        </pc:spChg>
+        <pc:spChg chg="add del mod">
+          <ac:chgData name="Fatima Pillosu" userId="a6295d4dc9e22643" providerId="LiveId" clId="{522B8EA6-2481-4C46-B3A5-6264BF778CA1}" dt="2024-10-09T16:12:01.562" v="415" actId="21"/>
+          <ac:spMkLst>
+            <pc:docMk/>
+            <pc:sldMk cId="1951859862" sldId="258"/>
+            <ac:spMk id="21" creationId="{CD62012C-A4F6-9DD2-4BE8-778BC032A994}"/>
+          </ac:spMkLst>
+        </pc:spChg>
+        <pc:spChg chg="add mod">
+          <ac:chgData name="Fatima Pillosu" userId="a6295d4dc9e22643" providerId="LiveId" clId="{522B8EA6-2481-4C46-B3A5-6264BF778CA1}" dt="2024-10-09T16:06:57.693" v="374" actId="1036"/>
+          <ac:spMkLst>
+            <pc:docMk/>
+            <pc:sldMk cId="1951859862" sldId="258"/>
+            <ac:spMk id="22" creationId="{07E9630E-1E4A-68C5-5585-8396C140FCEF}"/>
+          </ac:spMkLst>
+        </pc:spChg>
+        <pc:spChg chg="add mod ord">
+          <ac:chgData name="Fatima Pillosu" userId="a6295d4dc9e22643" providerId="LiveId" clId="{522B8EA6-2481-4C46-B3A5-6264BF778CA1}" dt="2024-10-09T16:06:42.287" v="365" actId="1076"/>
+          <ac:spMkLst>
+            <pc:docMk/>
+            <pc:sldMk cId="1951859862" sldId="258"/>
+            <ac:spMk id="23" creationId="{0CA2B182-F1A9-EB58-A305-8097A5A5DECB}"/>
+          </ac:spMkLst>
+        </pc:spChg>
+        <pc:spChg chg="add del mod ord">
+          <ac:chgData name="Fatima Pillosu" userId="a6295d4dc9e22643" providerId="LiveId" clId="{522B8EA6-2481-4C46-B3A5-6264BF778CA1}" dt="2024-10-09T16:10:24.299" v="393" actId="21"/>
+          <ac:spMkLst>
+            <pc:docMk/>
+            <pc:sldMk cId="1951859862" sldId="258"/>
+            <ac:spMk id="24" creationId="{B4891179-FC5C-D938-5E56-DB30EC1EC9D7}"/>
+          </ac:spMkLst>
+        </pc:spChg>
+        <pc:spChg chg="add mod">
+          <ac:chgData name="Fatima Pillosu" userId="a6295d4dc9e22643" providerId="LiveId" clId="{522B8EA6-2481-4C46-B3A5-6264BF778CA1}" dt="2024-10-09T16:10:36.174" v="405" actId="1036"/>
+          <ac:spMkLst>
+            <pc:docMk/>
+            <pc:sldMk cId="1951859862" sldId="258"/>
+            <ac:spMk id="25" creationId="{B4891179-FC5C-D938-5E56-DB30EC1EC9D7}"/>
+          </ac:spMkLst>
+        </pc:spChg>
+        <pc:spChg chg="add mod">
+          <ac:chgData name="Fatima Pillosu" userId="a6295d4dc9e22643" providerId="LiveId" clId="{522B8EA6-2481-4C46-B3A5-6264BF778CA1}" dt="2024-10-09T16:10:36.174" v="405" actId="1036"/>
+          <ac:spMkLst>
+            <pc:docMk/>
+            <pc:sldMk cId="1951859862" sldId="258"/>
+            <ac:spMk id="26" creationId="{E410AEEC-2D65-D54F-BAEF-5C49AEEE50FE}"/>
+          </ac:spMkLst>
+        </pc:spChg>
+        <pc:spChg chg="add mod">
+          <ac:chgData name="Fatima Pillosu" userId="a6295d4dc9e22643" providerId="LiveId" clId="{522B8EA6-2481-4C46-B3A5-6264BF778CA1}" dt="2024-10-09T16:10:36.174" v="405" actId="1036"/>
+          <ac:spMkLst>
+            <pc:docMk/>
+            <pc:sldMk cId="1951859862" sldId="258"/>
+            <ac:spMk id="27" creationId="{81B45D24-4A67-3E7C-6EF7-08BCAD5FEE72}"/>
+          </ac:spMkLst>
+        </pc:spChg>
+        <pc:spChg chg="add del mod ord">
+          <ac:chgData name="Fatima Pillosu" userId="a6295d4dc9e22643" providerId="LiveId" clId="{522B8EA6-2481-4C46-B3A5-6264BF778CA1}" dt="2024-10-09T16:12:01.562" v="415" actId="21"/>
+          <ac:spMkLst>
+            <pc:docMk/>
+            <pc:sldMk cId="1951859862" sldId="258"/>
+            <ac:spMk id="29" creationId="{71361E76-A983-9896-8058-886679C5D191}"/>
+          </ac:spMkLst>
+        </pc:spChg>
+        <pc:spChg chg="add mod">
+          <ac:chgData name="Fatima Pillosu" userId="a6295d4dc9e22643" providerId="LiveId" clId="{522B8EA6-2481-4C46-B3A5-6264BF778CA1}" dt="2024-10-09T16:11:59.093" v="414"/>
+          <ac:spMkLst>
+            <pc:docMk/>
+            <pc:sldMk cId="1951859862" sldId="258"/>
+            <ac:spMk id="30" creationId="{7287DB15-B760-F1A0-E835-601362269660}"/>
+          </ac:spMkLst>
+        </pc:spChg>
+        <pc:spChg chg="add mod">
+          <ac:chgData name="Fatima Pillosu" userId="a6295d4dc9e22643" providerId="LiveId" clId="{522B8EA6-2481-4C46-B3A5-6264BF778CA1}" dt="2024-10-09T16:11:59.093" v="414"/>
+          <ac:spMkLst>
+            <pc:docMk/>
+            <pc:sldMk cId="1951859862" sldId="258"/>
+            <ac:spMk id="31" creationId="{43CEC1A2-7E4F-41E4-A139-92DCFDE034F8}"/>
+          </ac:spMkLst>
+        </pc:spChg>
+        <pc:spChg chg="add mod">
+          <ac:chgData name="Fatima Pillosu" userId="a6295d4dc9e22643" providerId="LiveId" clId="{522B8EA6-2481-4C46-B3A5-6264BF778CA1}" dt="2024-10-09T16:11:59.093" v="414"/>
+          <ac:spMkLst>
+            <pc:docMk/>
+            <pc:sldMk cId="1951859862" sldId="258"/>
+            <ac:spMk id="32" creationId="{CCD594D3-FF3C-D59B-C478-8EEFD3DFEF2F}"/>
+          </ac:spMkLst>
+        </pc:spChg>
+        <pc:spChg chg="add mod">
+          <ac:chgData name="Fatima Pillosu" userId="a6295d4dc9e22643" providerId="LiveId" clId="{522B8EA6-2481-4C46-B3A5-6264BF778CA1}" dt="2024-10-09T16:12:08.247" v="417" actId="1076"/>
+          <ac:spMkLst>
+            <pc:docMk/>
+            <pc:sldMk cId="1951859862" sldId="258"/>
+            <ac:spMk id="34" creationId="{71361E76-A983-9896-8058-886679C5D191}"/>
+          </ac:spMkLst>
+        </pc:spChg>
+        <pc:spChg chg="add mod">
+          <ac:chgData name="Fatima Pillosu" userId="a6295d4dc9e22643" providerId="LiveId" clId="{522B8EA6-2481-4C46-B3A5-6264BF778CA1}" dt="2024-10-09T16:12:08.247" v="417" actId="1076"/>
+          <ac:spMkLst>
+            <pc:docMk/>
+            <pc:sldMk cId="1951859862" sldId="258"/>
+            <ac:spMk id="35" creationId="{12C4DF27-5A7D-5ECC-6792-E875BA82DE24}"/>
+          </ac:spMkLst>
+        </pc:spChg>
+        <pc:spChg chg="add mod">
+          <ac:chgData name="Fatima Pillosu" userId="a6295d4dc9e22643" providerId="LiveId" clId="{522B8EA6-2481-4C46-B3A5-6264BF778CA1}" dt="2024-10-09T16:12:08.247" v="417" actId="1076"/>
+          <ac:spMkLst>
+            <pc:docMk/>
+            <pc:sldMk cId="1951859862" sldId="258"/>
+            <ac:spMk id="36" creationId="{CD62012C-A4F6-9DD2-4BE8-778BC032A994}"/>
+          </ac:spMkLst>
+        </pc:spChg>
+        <pc:spChg chg="mod">
+          <ac:chgData name="Fatima Pillosu" userId="a6295d4dc9e22643" providerId="LiveId" clId="{522B8EA6-2481-4C46-B3A5-6264BF778CA1}" dt="2024-10-09T16:55:06.980" v="506" actId="20577"/>
+          <ac:spMkLst>
+            <pc:docMk/>
+            <pc:sldMk cId="1951859862" sldId="258"/>
+            <ac:spMk id="48" creationId="{3C8C9674-2410-015C-6748-F8FF7A96974A}"/>
+          </ac:spMkLst>
+        </pc:spChg>
+        <pc:spChg chg="mod">
+          <ac:chgData name="Fatima Pillosu" userId="a6295d4dc9e22643" providerId="LiveId" clId="{522B8EA6-2481-4C46-B3A5-6264BF778CA1}" dt="2024-10-09T16:54:19.653" v="500" actId="1038"/>
+          <ac:spMkLst>
+            <pc:docMk/>
+            <pc:sldMk cId="1951859862" sldId="258"/>
+            <ac:spMk id="49" creationId="{C7DBD87C-EAD9-FFFC-2DCB-C93185EFF93E}"/>
+          </ac:spMkLst>
+        </pc:spChg>
+        <pc:spChg chg="mod">
+          <ac:chgData name="Fatima Pillosu" userId="a6295d4dc9e22643" providerId="LiveId" clId="{522B8EA6-2481-4C46-B3A5-6264BF778CA1}" dt="2024-10-09T16:53:57.452" v="450" actId="1037"/>
+          <ac:spMkLst>
+            <pc:docMk/>
+            <pc:sldMk cId="1951859862" sldId="258"/>
+            <ac:spMk id="50" creationId="{174C1E55-3EDE-EB87-CF29-5783D5D6F998}"/>
+          </ac:spMkLst>
+        </pc:spChg>
+        <pc:spChg chg="mod">
+          <ac:chgData name="Fatima Pillosu" userId="a6295d4dc9e22643" providerId="LiveId" clId="{522B8EA6-2481-4C46-B3A5-6264BF778CA1}" dt="2024-10-09T16:54:06.590" v="467" actId="1038"/>
+          <ac:spMkLst>
+            <pc:docMk/>
+            <pc:sldMk cId="1951859862" sldId="258"/>
+            <ac:spMk id="51" creationId="{05450518-DBCA-A583-801C-4A82350BA285}"/>
+          </ac:spMkLst>
+        </pc:spChg>
+        <pc:spChg chg="mod">
+          <ac:chgData name="Fatima Pillosu" userId="a6295d4dc9e22643" providerId="LiveId" clId="{522B8EA6-2481-4C46-B3A5-6264BF778CA1}" dt="2024-10-09T16:54:19.653" v="500" actId="1038"/>
+          <ac:spMkLst>
+            <pc:docMk/>
+            <pc:sldMk cId="1951859862" sldId="258"/>
+            <ac:spMk id="60" creationId="{384A18B1-386A-21ED-5273-485373CC82CE}"/>
+          </ac:spMkLst>
+        </pc:spChg>
+        <pc:spChg chg="mod">
+          <ac:chgData name="Fatima Pillosu" userId="a6295d4dc9e22643" providerId="LiveId" clId="{522B8EA6-2481-4C46-B3A5-6264BF778CA1}" dt="2024-10-09T16:54:06.590" v="467" actId="1038"/>
+          <ac:spMkLst>
+            <pc:docMk/>
+            <pc:sldMk cId="1951859862" sldId="258"/>
+            <ac:spMk id="61" creationId="{6776B6D5-31DE-5B39-8EEA-034F32CD9204}"/>
+          </ac:spMkLst>
+        </pc:spChg>
+        <pc:spChg chg="mod">
+          <ac:chgData name="Fatima Pillosu" userId="a6295d4dc9e22643" providerId="LiveId" clId="{522B8EA6-2481-4C46-B3A5-6264BF778CA1}" dt="2024-10-09T16:53:57.452" v="450" actId="1037"/>
+          <ac:spMkLst>
+            <pc:docMk/>
+            <pc:sldMk cId="1951859862" sldId="258"/>
+            <ac:spMk id="62" creationId="{9A5C7027-EB23-E397-A431-F93B39C7BE8A}"/>
+          </ac:spMkLst>
+        </pc:spChg>
+        <pc:picChg chg="mod modCrop">
+          <ac:chgData name="Fatima Pillosu" userId="a6295d4dc9e22643" providerId="LiveId" clId="{522B8EA6-2481-4C46-B3A5-6264BF778CA1}" dt="2024-10-09T16:00:45.979" v="267" actId="1038"/>
+          <ac:picMkLst>
+            <pc:docMk/>
+            <pc:sldMk cId="1951859862" sldId="258"/>
+            <ac:picMk id="3" creationId="{AC976400-B30A-DCDD-3D85-20A41B1FBFA4}"/>
+          </ac:picMkLst>
+        </pc:picChg>
+        <pc:picChg chg="mod ord modCrop">
+          <ac:chgData name="Fatima Pillosu" userId="a6295d4dc9e22643" providerId="LiveId" clId="{522B8EA6-2481-4C46-B3A5-6264BF778CA1}" dt="2024-10-09T16:06:57.693" v="374" actId="1036"/>
+          <ac:picMkLst>
+            <pc:docMk/>
+            <pc:sldMk cId="1951859862" sldId="258"/>
+            <ac:picMk id="7" creationId="{7F903BC0-5596-6FFC-9D17-B32FBDF4B485}"/>
+          </ac:picMkLst>
+        </pc:picChg>
+        <pc:picChg chg="mod modCrop">
+          <ac:chgData name="Fatima Pillosu" userId="a6295d4dc9e22643" providerId="LiveId" clId="{522B8EA6-2481-4C46-B3A5-6264BF778CA1}" dt="2024-10-09T15:50:49.760" v="16" actId="732"/>
+          <ac:picMkLst>
+            <pc:docMk/>
+            <pc:sldMk cId="1951859862" sldId="258"/>
+            <ac:picMk id="9" creationId="{A9C37FC3-9582-128D-AE25-E6B5EA63C4AB}"/>
+          </ac:picMkLst>
+        </pc:picChg>
+        <pc:picChg chg="mod ord modCrop">
+          <ac:chgData name="Fatima Pillosu" userId="a6295d4dc9e22643" providerId="LiveId" clId="{522B8EA6-2481-4C46-B3A5-6264BF778CA1}" dt="2024-10-09T16:06:42.287" v="365" actId="1076"/>
+          <ac:picMkLst>
+            <pc:docMk/>
+            <pc:sldMk cId="1951859862" sldId="258"/>
+            <ac:picMk id="11" creationId="{9ED1403E-D2E3-E1CC-FF3D-4514FDE5C41B}"/>
+          </ac:picMkLst>
+        </pc:picChg>
+        <pc:picChg chg="add mod">
+          <ac:chgData name="Fatima Pillosu" userId="a6295d4dc9e22643" providerId="LiveId" clId="{522B8EA6-2481-4C46-B3A5-6264BF778CA1}" dt="2024-10-09T16:10:36.174" v="405" actId="1036"/>
+          <ac:picMkLst>
+            <pc:docMk/>
+            <pc:sldMk cId="1951859862" sldId="258"/>
+            <ac:picMk id="28" creationId="{8A29DF26-A7AD-2B94-05D3-856FFC328DED}"/>
+          </ac:picMkLst>
+        </pc:picChg>
+        <pc:picChg chg="add mod">
+          <ac:chgData name="Fatima Pillosu" userId="a6295d4dc9e22643" providerId="LiveId" clId="{522B8EA6-2481-4C46-B3A5-6264BF778CA1}" dt="2024-10-09T16:11:59.093" v="414"/>
+          <ac:picMkLst>
+            <pc:docMk/>
+            <pc:sldMk cId="1951859862" sldId="258"/>
+            <ac:picMk id="33" creationId="{5370AB70-1DA6-9FAD-6E8C-E9D4402881B6}"/>
+          </ac:picMkLst>
+        </pc:picChg>
+        <pc:picChg chg="add mod">
+          <ac:chgData name="Fatima Pillosu" userId="a6295d4dc9e22643" providerId="LiveId" clId="{522B8EA6-2481-4C46-B3A5-6264BF778CA1}" dt="2024-10-09T16:12:08.247" v="417" actId="1076"/>
+          <ac:picMkLst>
+            <pc:docMk/>
+            <pc:sldMk cId="1951859862" sldId="258"/>
+            <ac:picMk id="37" creationId="{F8D1C17E-B765-874E-BC9B-DA6009B9A484}"/>
+          </ac:picMkLst>
+        </pc:picChg>
+        <pc:picChg chg="mod modCrop">
+          <ac:chgData name="Fatima Pillosu" userId="a6295d4dc9e22643" providerId="LiveId" clId="{522B8EA6-2481-4C46-B3A5-6264BF778CA1}" dt="2024-10-09T15:51:06.664" v="18" actId="732"/>
+          <ac:picMkLst>
+            <pc:docMk/>
+            <pc:sldMk cId="1951859862" sldId="258"/>
+            <ac:picMk id="70" creationId="{2FD2DA3E-D2A7-E1CC-AD1F-13B5F4A928F4}"/>
+          </ac:picMkLst>
+        </pc:picChg>
+        <pc:picChg chg="mod modCrop">
+          <ac:chgData name="Fatima Pillosu" userId="a6295d4dc9e22643" providerId="LiveId" clId="{522B8EA6-2481-4C46-B3A5-6264BF778CA1}" dt="2024-10-09T15:51:13.789" v="20" actId="732"/>
+          <ac:picMkLst>
+            <pc:docMk/>
+            <pc:sldMk cId="1951859862" sldId="258"/>
+            <ac:picMk id="71" creationId="{B1858B0B-AFCD-5BA8-BAAF-B9AE449AF9AC}"/>
+          </ac:picMkLst>
+        </pc:picChg>
+        <pc:picChg chg="del mod ord modCrop">
+          <ac:chgData name="Fatima Pillosu" userId="a6295d4dc9e22643" providerId="LiveId" clId="{522B8EA6-2481-4C46-B3A5-6264BF778CA1}" dt="2024-10-09T16:10:24.299" v="393" actId="21"/>
+          <ac:picMkLst>
+            <pc:docMk/>
+            <pc:sldMk cId="1951859862" sldId="258"/>
+            <ac:picMk id="74" creationId="{8A29DF26-A7AD-2B94-05D3-856FFC328DED}"/>
+          </ac:picMkLst>
+        </pc:picChg>
+        <pc:picChg chg="del mod ord modCrop">
+          <ac:chgData name="Fatima Pillosu" userId="a6295d4dc9e22643" providerId="LiveId" clId="{522B8EA6-2481-4C46-B3A5-6264BF778CA1}" dt="2024-10-09T16:12:01.562" v="415" actId="21"/>
+          <ac:picMkLst>
+            <pc:docMk/>
+            <pc:sldMk cId="1951859862" sldId="258"/>
+            <ac:picMk id="75" creationId="{F8D1C17E-B765-874E-BC9B-DA6009B9A484}"/>
+          </ac:picMkLst>
+        </pc:picChg>
+        <pc:cxnChg chg="mod">
+          <ac:chgData name="Fatima Pillosu" userId="a6295d4dc9e22643" providerId="LiveId" clId="{522B8EA6-2481-4C46-B3A5-6264BF778CA1}" dt="2024-10-09T16:53:57.452" v="450" actId="1037"/>
+          <ac:cxnSpMkLst>
+            <pc:docMk/>
+            <pc:sldMk cId="1951859862" sldId="258"/>
+            <ac:cxnSpMk id="54" creationId="{DC4D9302-7696-805C-F4A4-02A8D330E7AB}"/>
+          </ac:cxnSpMkLst>
+        </pc:cxnChg>
+        <pc:cxnChg chg="mod">
+          <ac:chgData name="Fatima Pillosu" userId="a6295d4dc9e22643" providerId="LiveId" clId="{522B8EA6-2481-4C46-B3A5-6264BF778CA1}" dt="2024-10-09T16:54:06.590" v="467" actId="1038"/>
+          <ac:cxnSpMkLst>
+            <pc:docMk/>
+            <pc:sldMk cId="1951859862" sldId="258"/>
+            <ac:cxnSpMk id="55" creationId="{9F4B0A86-EBBC-47DC-6AC4-35BDDAE97F2F}"/>
+          </ac:cxnSpMkLst>
+        </pc:cxnChg>
+        <pc:cxnChg chg="mod">
+          <ac:chgData name="Fatima Pillosu" userId="a6295d4dc9e22643" providerId="LiveId" clId="{522B8EA6-2481-4C46-B3A5-6264BF778CA1}" dt="2024-10-09T16:54:19.653" v="500" actId="1038"/>
+          <ac:cxnSpMkLst>
+            <pc:docMk/>
+            <pc:sldMk cId="1951859862" sldId="258"/>
+            <ac:cxnSpMk id="56" creationId="{C84CA041-2642-E396-D1BB-53C75CDDDE35}"/>
+          </ac:cxnSpMkLst>
+        </pc:cxnChg>
+      </pc:sldChg>
+    </pc:docChg>
+  </pc:docChgLst>
   <pc:docChgLst>
     <pc:chgData name="Fatima Pillosu" userId="a6295d4dc9e22643" providerId="LiveId" clId="{47DCB951-EA53-4157-9AD3-C351E4E0652B}"/>
     <pc:docChg chg="undo custSel modSld">
@@ -416,7 +832,7 @@
           <a:p>
             <a:fld id="{7961C505-96F3-4AB3-816F-58D810F2D260}" type="datetimeFigureOut">
               <a:rPr lang="en-GB" smtClean="0"/>
-              <a:t>02/10/2024</a:t>
+              <a:t>09/10/2024</a:t>
             </a:fld>
             <a:endParaRPr lang="en-GB"/>
           </a:p>
@@ -586,7 +1002,7 @@
           <a:p>
             <a:fld id="{7961C505-96F3-4AB3-816F-58D810F2D260}" type="datetimeFigureOut">
               <a:rPr lang="en-GB" smtClean="0"/>
-              <a:t>02/10/2024</a:t>
+              <a:t>09/10/2024</a:t>
             </a:fld>
             <a:endParaRPr lang="en-GB"/>
           </a:p>
@@ -766,7 +1182,7 @@
           <a:p>
             <a:fld id="{7961C505-96F3-4AB3-816F-58D810F2D260}" type="datetimeFigureOut">
               <a:rPr lang="en-GB" smtClean="0"/>
-              <a:t>02/10/2024</a:t>
+              <a:t>09/10/2024</a:t>
             </a:fld>
             <a:endParaRPr lang="en-GB"/>
           </a:p>
@@ -936,7 +1352,7 @@
           <a:p>
             <a:fld id="{7961C505-96F3-4AB3-816F-58D810F2D260}" type="datetimeFigureOut">
               <a:rPr lang="en-GB" smtClean="0"/>
-              <a:t>02/10/2024</a:t>
+              <a:t>09/10/2024</a:t>
             </a:fld>
             <a:endParaRPr lang="en-GB"/>
           </a:p>
@@ -1180,7 +1596,7 @@
           <a:p>
             <a:fld id="{7961C505-96F3-4AB3-816F-58D810F2D260}" type="datetimeFigureOut">
               <a:rPr lang="en-GB" smtClean="0"/>
-              <a:t>02/10/2024</a:t>
+              <a:t>09/10/2024</a:t>
             </a:fld>
             <a:endParaRPr lang="en-GB"/>
           </a:p>
@@ -1412,7 +1828,7 @@
           <a:p>
             <a:fld id="{7961C505-96F3-4AB3-816F-58D810F2D260}" type="datetimeFigureOut">
               <a:rPr lang="en-GB" smtClean="0"/>
-              <a:t>02/10/2024</a:t>
+              <a:t>09/10/2024</a:t>
             </a:fld>
             <a:endParaRPr lang="en-GB"/>
           </a:p>
@@ -1779,7 +2195,7 @@
           <a:p>
             <a:fld id="{7961C505-96F3-4AB3-816F-58D810F2D260}" type="datetimeFigureOut">
               <a:rPr lang="en-GB" smtClean="0"/>
-              <a:t>02/10/2024</a:t>
+              <a:t>09/10/2024</a:t>
             </a:fld>
             <a:endParaRPr lang="en-GB"/>
           </a:p>
@@ -1897,7 +2313,7 @@
           <a:p>
             <a:fld id="{7961C505-96F3-4AB3-816F-58D810F2D260}" type="datetimeFigureOut">
               <a:rPr lang="en-GB" smtClean="0"/>
-              <a:t>02/10/2024</a:t>
+              <a:t>09/10/2024</a:t>
             </a:fld>
             <a:endParaRPr lang="en-GB"/>
           </a:p>
@@ -1992,7 +2408,7 @@
           <a:p>
             <a:fld id="{7961C505-96F3-4AB3-816F-58D810F2D260}" type="datetimeFigureOut">
               <a:rPr lang="en-GB" smtClean="0"/>
-              <a:t>02/10/2024</a:t>
+              <a:t>09/10/2024</a:t>
             </a:fld>
             <a:endParaRPr lang="en-GB"/>
           </a:p>
@@ -2269,7 +2685,7 @@
           <a:p>
             <a:fld id="{7961C505-96F3-4AB3-816F-58D810F2D260}" type="datetimeFigureOut">
               <a:rPr lang="en-GB" smtClean="0"/>
-              <a:t>02/10/2024</a:t>
+              <a:t>09/10/2024</a:t>
             </a:fld>
             <a:endParaRPr lang="en-GB"/>
           </a:p>
@@ -2526,7 +2942,7 @@
           <a:p>
             <a:fld id="{7961C505-96F3-4AB3-816F-58D810F2D260}" type="datetimeFigureOut">
               <a:rPr lang="en-GB" smtClean="0"/>
-              <a:t>02/10/2024</a:t>
+              <a:t>09/10/2024</a:t>
             </a:fld>
             <a:endParaRPr lang="en-GB"/>
           </a:p>
@@ -2739,7 +3155,7 @@
           <a:p>
             <a:fld id="{7961C505-96F3-4AB3-816F-58D810F2D260}" type="datetimeFigureOut">
               <a:rPr lang="en-GB" smtClean="0"/>
-              <a:t>02/10/2024</a:t>
+              <a:t>09/10/2024</a:t>
             </a:fld>
             <a:endParaRPr lang="en-GB"/>
           </a:p>
@@ -3159,7 +3575,7 @@
         <p:spPr>
           <a:xfrm>
             <a:off x="-46666" y="-40664"/>
-            <a:ext cx="5923700" cy="276999"/>
+            <a:ext cx="6889218" cy="276999"/>
           </a:xfrm>
           <a:prstGeom prst="rect">
             <a:avLst/>
@@ -3182,7 +3598,31 @@
                 </a:solidFill>
                 <a:latin typeface="Aptos" panose="020B0004020202020204" pitchFamily="34" charset="0"/>
               </a:rPr>
-              <a:t>Empirical Cumulative Distribution Functions (ECDFs) for 24-hourly rainfall</a:t>
+              <a:t>Empirical Cumulative Distribution Functions (ECDFs) for </a:t>
+            </a:r>
+            <a:r>
+              <a:rPr lang="en-US" sz="1200" b="1">
+                <a:solidFill>
+                  <a:schemeClr val="tx1">
+                    <a:lumMod val="85000"/>
+                    <a:lumOff val="15000"/>
+                  </a:schemeClr>
+                </a:solidFill>
+                <a:latin typeface="Aptos" panose="020B0004020202020204" pitchFamily="34" charset="0"/>
+              </a:rPr>
+              <a:t>24-hourly total precipitation </a:t>
+            </a:r>
+            <a:r>
+              <a:rPr lang="en-US" sz="1200" b="1" dirty="0">
+                <a:solidFill>
+                  <a:schemeClr val="tx1">
+                    <a:lumMod val="85000"/>
+                    <a:lumOff val="15000"/>
+                  </a:schemeClr>
+                </a:solidFill>
+                <a:latin typeface="Aptos" panose="020B0004020202020204" pitchFamily="34" charset="0"/>
+              </a:rPr>
+              <a:t>(tp)</a:t>
             </a:r>
           </a:p>
         </p:txBody>
@@ -3201,8 +3641,8 @@
         </p:nvSpPr>
         <p:spPr>
           <a:xfrm>
-            <a:off x="3983793" y="198002"/>
-            <a:ext cx="1484651" cy="276999"/>
+            <a:off x="3420195" y="198002"/>
+            <a:ext cx="1962682" cy="276999"/>
           </a:xfrm>
           <a:prstGeom prst="rect">
             <a:avLst/>
@@ -3225,7 +3665,7 @@
                 </a:solidFill>
                 <a:latin typeface="Aptos" panose="020B0004020202020204" pitchFamily="34" charset="0"/>
               </a:rPr>
-              <a:t>Reforecast_46r1</a:t>
+              <a:t>ECMWF Reforecast - 46r1</a:t>
             </a:r>
           </a:p>
         </p:txBody>
@@ -3244,7 +3684,7 @@
         </p:nvSpPr>
         <p:spPr>
           <a:xfrm>
-            <a:off x="1349753" y="198002"/>
+            <a:off x="1148468" y="198002"/>
             <a:ext cx="1303831" cy="276999"/>
           </a:xfrm>
           <a:prstGeom prst="rect">
@@ -3287,7 +3727,7 @@
         </p:nvSpPr>
         <p:spPr>
           <a:xfrm>
-            <a:off x="2788517" y="198002"/>
+            <a:off x="2449208" y="198002"/>
             <a:ext cx="1303831" cy="276999"/>
           </a:xfrm>
           <a:prstGeom prst="rect">
@@ -3418,7 +3858,7 @@
         </p:nvCxnSpPr>
         <p:spPr>
           <a:xfrm>
-            <a:off x="1143855" y="335175"/>
+            <a:off x="942570" y="335175"/>
             <a:ext cx="270000" cy="2652"/>
           </a:xfrm>
           <a:prstGeom prst="line">
@@ -3461,7 +3901,7 @@
         </p:nvCxnSpPr>
         <p:spPr>
           <a:xfrm>
-            <a:off x="2585699" y="335175"/>
+            <a:off x="2246390" y="335175"/>
             <a:ext cx="270000" cy="2652"/>
           </a:xfrm>
           <a:prstGeom prst="line">
@@ -3504,7 +3944,7 @@
         </p:nvCxnSpPr>
         <p:spPr>
           <a:xfrm>
-            <a:off x="3783550" y="335175"/>
+            <a:off x="3219952" y="335175"/>
             <a:ext cx="270000" cy="2652"/>
           </a:xfrm>
           <a:prstGeom prst="line">
@@ -3694,7 +4134,7 @@
         </p:nvSpPr>
         <p:spPr>
           <a:xfrm>
-            <a:off x="3882550" y="300501"/>
+            <a:off x="3318952" y="300501"/>
             <a:ext cx="72000" cy="72000"/>
           </a:xfrm>
           <a:prstGeom prst="ellipse">
@@ -3748,7 +4188,7 @@
         </p:nvSpPr>
         <p:spPr>
           <a:xfrm>
-            <a:off x="2684699" y="300501"/>
+            <a:off x="2345390" y="300501"/>
             <a:ext cx="72000" cy="72000"/>
           </a:xfrm>
           <a:prstGeom prst="ellipse">
@@ -3802,7 +4242,7 @@
         </p:nvSpPr>
         <p:spPr>
           <a:xfrm>
-            <a:off x="1242855" y="300501"/>
+            <a:off x="1041570" y="300501"/>
             <a:ext cx="72000" cy="72000"/>
           </a:xfrm>
           <a:prstGeom prst="ellipse">
@@ -4151,7 +4591,7 @@
           </p:cNvPicPr>
           <p:nvPr/>
         </p:nvPicPr>
-        <p:blipFill>
+        <p:blipFill rotWithShape="1">
           <a:blip r:embed="rId2">
             <a:extLst>
               <a:ext uri="{28A0092B-C50C-407E-A947-70E740481C1C}">
@@ -4159,13 +4599,13 @@
               </a:ext>
             </a:extLst>
           </a:blip>
-          <a:srcRect l="3631" t="11258" r="9286"/>
+          <a:srcRect l="6643" t="11258" r="9285" b="5538"/>
           <a:stretch/>
         </p:blipFill>
         <p:spPr>
           <a:xfrm>
-            <a:off x="28575" y="3787420"/>
-            <a:ext cx="3297195" cy="2520000"/>
+            <a:off x="142589" y="3787420"/>
+            <a:ext cx="3183181" cy="2362740"/>
           </a:xfrm>
           <a:prstGeom prst="rect">
             <a:avLst/>
@@ -4186,105 +4626,19 @@
           </p:cNvPicPr>
           <p:nvPr/>
         </p:nvPicPr>
-        <p:blipFill>
+        <p:blipFill rotWithShape="1">
           <a:blip r:embed="rId3"/>
-          <a:srcRect l="3631" t="11258" r="9286"/>
+          <a:srcRect l="6354" t="11258" r="9286" b="5538"/>
           <a:stretch/>
         </p:blipFill>
         <p:spPr>
           <a:xfrm>
-            <a:off x="3545356" y="3787420"/>
-            <a:ext cx="3297196" cy="2520000"/>
+            <a:off x="3648458" y="3787420"/>
+            <a:ext cx="3194094" cy="2362740"/>
           </a:xfrm>
           <a:prstGeom prst="rect">
             <a:avLst/>
           </a:prstGeom>
-        </p:spPr>
-      </p:pic>
-      <p:pic>
-        <p:nvPicPr>
-          <p:cNvPr id="74" name="Picture 73" descr="A graph of different colored lines&#10;&#10;Description automatically generated">
-            <a:extLst>
-              <a:ext uri="{FF2B5EF4-FFF2-40B4-BE49-F238E27FC236}">
-                <a16:creationId xmlns:a16="http://schemas.microsoft.com/office/drawing/2014/main" id="{8A29DF26-A7AD-2B94-05D3-856FFC328DED}"/>
-              </a:ext>
-            </a:extLst>
-          </p:cNvPr>
-          <p:cNvPicPr>
-            <a:picLocks noChangeAspect="1"/>
-          </p:cNvPicPr>
-          <p:nvPr/>
-        </p:nvPicPr>
-        <p:blipFill>
-          <a:blip r:embed="rId4">
-            <a:extLst>
-              <a:ext uri="{28A0092B-C50C-407E-A947-70E740481C1C}">
-                <a14:useLocalDpi xmlns:a14="http://schemas.microsoft.com/office/drawing/2010/main" val="0"/>
-              </a:ext>
-            </a:extLst>
-          </a:blip>
-          <a:srcRect l="3363" t="10556" r="6914"/>
-          <a:stretch/>
-        </p:blipFill>
-        <p:spPr>
-          <a:xfrm>
-            <a:off x="1100502" y="4240240"/>
-            <a:ext cx="2166708" cy="1620000"/>
-          </a:xfrm>
-          <a:prstGeom prst="rect">
-            <a:avLst/>
-          </a:prstGeom>
-          <a:ln w="3175">
-            <a:solidFill>
-              <a:schemeClr val="tx1">
-                <a:lumMod val="50000"/>
-                <a:lumOff val="50000"/>
-              </a:schemeClr>
-            </a:solidFill>
-          </a:ln>
-        </p:spPr>
-      </p:pic>
-      <p:pic>
-        <p:nvPicPr>
-          <p:cNvPr id="75" name="Picture 74" descr="A graph of a graph&#10;&#10;Description automatically generated with medium confidence">
-            <a:extLst>
-              <a:ext uri="{FF2B5EF4-FFF2-40B4-BE49-F238E27FC236}">
-                <a16:creationId xmlns:a16="http://schemas.microsoft.com/office/drawing/2014/main" id="{F8D1C17E-B765-874E-BC9B-DA6009B9A484}"/>
-              </a:ext>
-            </a:extLst>
-          </p:cNvPr>
-          <p:cNvPicPr>
-            <a:picLocks noChangeAspect="1"/>
-          </p:cNvPicPr>
-          <p:nvPr/>
-        </p:nvPicPr>
-        <p:blipFill>
-          <a:blip r:embed="rId5">
-            <a:extLst>
-              <a:ext uri="{28A0092B-C50C-407E-A947-70E740481C1C}">
-                <a14:useLocalDpi xmlns:a14="http://schemas.microsoft.com/office/drawing/2010/main" val="0"/>
-              </a:ext>
-            </a:extLst>
-          </a:blip>
-          <a:srcRect l="3363" t="10556" r="6914"/>
-          <a:stretch/>
-        </p:blipFill>
-        <p:spPr>
-          <a:xfrm>
-            <a:off x="4477338" y="4240240"/>
-            <a:ext cx="2166709" cy="1620000"/>
-          </a:xfrm>
-          <a:prstGeom prst="rect">
-            <a:avLst/>
-          </a:prstGeom>
-          <a:ln w="3175">
-            <a:solidFill>
-              <a:schemeClr val="tx1">
-                <a:lumMod val="50000"/>
-                <a:lumOff val="50000"/>
-              </a:schemeClr>
-            </a:solidFill>
-          </a:ln>
         </p:spPr>
       </p:pic>
       <p:pic>
@@ -4301,56 +4655,21 @@
           </p:cNvPicPr>
           <p:nvPr/>
         </p:nvPicPr>
-        <p:blipFill>
-          <a:blip r:embed="rId6">
+        <p:blipFill rotWithShape="1">
+          <a:blip r:embed="rId4">
             <a:extLst>
               <a:ext uri="{28A0092B-C50C-407E-A947-70E740481C1C}">
                 <a14:useLocalDpi xmlns:a14="http://schemas.microsoft.com/office/drawing/2010/main" val="0"/>
               </a:ext>
             </a:extLst>
           </a:blip>
-          <a:srcRect l="3578" t="11826" r="8522"/>
+          <a:srcRect l="6571" t="11825" r="8522" b="5503"/>
           <a:stretch/>
         </p:blipFill>
         <p:spPr>
           <a:xfrm>
-            <a:off x="28575" y="882795"/>
-            <a:ext cx="3349568" cy="2520000"/>
-          </a:xfrm>
-          <a:prstGeom prst="rect">
-            <a:avLst/>
-          </a:prstGeom>
-        </p:spPr>
-      </p:pic>
-      <p:pic>
-        <p:nvPicPr>
-          <p:cNvPr id="7" name="Picture 6" descr="A graph of a rainfall&#10;&#10;Description automatically generated with medium confidence">
-            <a:extLst>
-              <a:ext uri="{FF2B5EF4-FFF2-40B4-BE49-F238E27FC236}">
-                <a16:creationId xmlns:a16="http://schemas.microsoft.com/office/drawing/2014/main" id="{7F903BC0-5596-6FFC-9D17-B32FBDF4B485}"/>
-              </a:ext>
-            </a:extLst>
-          </p:cNvPr>
-          <p:cNvPicPr>
-            <a:picLocks noChangeAspect="1"/>
-          </p:cNvPicPr>
-          <p:nvPr/>
-        </p:nvPicPr>
-        <p:blipFill>
-          <a:blip r:embed="rId7">
-            <a:extLst>
-              <a:ext uri="{28A0092B-C50C-407E-A947-70E740481C1C}">
-                <a14:useLocalDpi xmlns:a14="http://schemas.microsoft.com/office/drawing/2010/main" val="0"/>
-              </a:ext>
-            </a:extLst>
-          </a:blip>
-          <a:srcRect l="3119" t="9853" r="7594"/>
-          <a:stretch/>
-        </p:blipFill>
-        <p:spPr>
-          <a:xfrm>
-            <a:off x="978589" y="1342096"/>
-            <a:ext cx="2139362" cy="1620000"/>
+            <a:off x="142589" y="882795"/>
+            <a:ext cx="3235554" cy="2362740"/>
           </a:xfrm>
           <a:prstGeom prst="rect">
             <a:avLst/>
@@ -4371,27 +4690,684 @@
           </p:cNvPicPr>
           <p:nvPr/>
         </p:nvPicPr>
-        <p:blipFill>
-          <a:blip r:embed="rId8">
+        <p:blipFill rotWithShape="1">
+          <a:blip r:embed="rId5">
             <a:extLst>
               <a:ext uri="{28A0092B-C50C-407E-A947-70E740481C1C}">
                 <a14:useLocalDpi xmlns:a14="http://schemas.microsoft.com/office/drawing/2010/main" val="0"/>
               </a:ext>
             </a:extLst>
           </a:blip>
-          <a:srcRect l="3284" t="11494" r="9169"/>
+          <a:srcRect l="7087" t="11494" r="9169" b="5524"/>
           <a:stretch/>
         </p:blipFill>
         <p:spPr>
           <a:xfrm>
-            <a:off x="3518955" y="892096"/>
-            <a:ext cx="3323597" cy="2520000"/>
+            <a:off x="3663351" y="892096"/>
+            <a:ext cx="3179201" cy="2362740"/>
           </a:xfrm>
           <a:prstGeom prst="rect">
             <a:avLst/>
           </a:prstGeom>
         </p:spPr>
       </p:pic>
+      <p:sp>
+        <p:nvSpPr>
+          <p:cNvPr id="2" name="TextBox 1">
+            <a:extLst>
+              <a:ext uri="{FF2B5EF4-FFF2-40B4-BE49-F238E27FC236}">
+                <a16:creationId xmlns:a16="http://schemas.microsoft.com/office/drawing/2014/main" id="{7DC99155-5A73-0EDA-66CC-4D16BBE95418}"/>
+              </a:ext>
+            </a:extLst>
+          </p:cNvPr>
+          <p:cNvSpPr txBox="1"/>
+          <p:nvPr/>
+        </p:nvSpPr>
+        <p:spPr>
+          <a:xfrm>
+            <a:off x="373812" y="3205684"/>
+            <a:ext cx="2951958" cy="215444"/>
+          </a:xfrm>
+          <a:prstGeom prst="rect">
+            <a:avLst/>
+          </a:prstGeom>
+          <a:noFill/>
+        </p:spPr>
+        <p:txBody>
+          <a:bodyPr wrap="square" rtlCol="0">
+            <a:spAutoFit/>
+          </a:bodyPr>
+          <a:lstStyle/>
+          <a:p>
+            <a:pPr algn="ctr"/>
+            <a:r>
+              <a:rPr lang="en-US" sz="800" dirty="0">
+                <a:solidFill>
+                  <a:schemeClr val="bg2">
+                    <a:lumMod val="10000"/>
+                  </a:schemeClr>
+                </a:solidFill>
+                <a:latin typeface="Aptos" panose="020B0004020202020204" pitchFamily="34" charset="0"/>
+              </a:rPr>
+              <a:t>tp [mm/24h]</a:t>
+            </a:r>
+            <a:endParaRPr lang="en-GB" sz="800" dirty="0">
+              <a:solidFill>
+                <a:schemeClr val="bg2">
+                  <a:lumMod val="10000"/>
+                </a:schemeClr>
+              </a:solidFill>
+              <a:latin typeface="Aptos" panose="020B0004020202020204" pitchFamily="34" charset="0"/>
+            </a:endParaRPr>
+          </a:p>
+        </p:txBody>
+      </p:sp>
+      <p:sp>
+        <p:nvSpPr>
+          <p:cNvPr id="4" name="TextBox 3">
+            <a:extLst>
+              <a:ext uri="{FF2B5EF4-FFF2-40B4-BE49-F238E27FC236}">
+                <a16:creationId xmlns:a16="http://schemas.microsoft.com/office/drawing/2014/main" id="{A72162B1-E4A6-C2FA-C51F-ED8414816C83}"/>
+              </a:ext>
+            </a:extLst>
+          </p:cNvPr>
+          <p:cNvSpPr txBox="1"/>
+          <p:nvPr/>
+        </p:nvSpPr>
+        <p:spPr>
+          <a:xfrm>
+            <a:off x="3882550" y="3211337"/>
+            <a:ext cx="2951958" cy="215444"/>
+          </a:xfrm>
+          <a:prstGeom prst="rect">
+            <a:avLst/>
+          </a:prstGeom>
+          <a:noFill/>
+        </p:spPr>
+        <p:txBody>
+          <a:bodyPr wrap="square" rtlCol="0">
+            <a:spAutoFit/>
+          </a:bodyPr>
+          <a:lstStyle/>
+          <a:p>
+            <a:pPr algn="ctr"/>
+            <a:r>
+              <a:rPr lang="en-US" sz="800" dirty="0">
+                <a:solidFill>
+                  <a:schemeClr val="bg2">
+                    <a:lumMod val="10000"/>
+                  </a:schemeClr>
+                </a:solidFill>
+                <a:latin typeface="Aptos" panose="020B0004020202020204" pitchFamily="34" charset="0"/>
+              </a:rPr>
+              <a:t>tp [mm/24h]</a:t>
+            </a:r>
+            <a:endParaRPr lang="en-GB" sz="800" dirty="0">
+              <a:solidFill>
+                <a:schemeClr val="bg2">
+                  <a:lumMod val="10000"/>
+                </a:schemeClr>
+              </a:solidFill>
+              <a:latin typeface="Aptos" panose="020B0004020202020204" pitchFamily="34" charset="0"/>
+            </a:endParaRPr>
+          </a:p>
+        </p:txBody>
+      </p:sp>
+      <p:sp>
+        <p:nvSpPr>
+          <p:cNvPr id="5" name="TextBox 4">
+            <a:extLst>
+              <a:ext uri="{FF2B5EF4-FFF2-40B4-BE49-F238E27FC236}">
+                <a16:creationId xmlns:a16="http://schemas.microsoft.com/office/drawing/2014/main" id="{8C135897-AF3D-0879-B7A8-8FD200B128AA}"/>
+              </a:ext>
+            </a:extLst>
+          </p:cNvPr>
+          <p:cNvSpPr txBox="1"/>
+          <p:nvPr/>
+        </p:nvSpPr>
+        <p:spPr>
+          <a:xfrm>
+            <a:off x="373812" y="6104422"/>
+            <a:ext cx="2951958" cy="215444"/>
+          </a:xfrm>
+          <a:prstGeom prst="rect">
+            <a:avLst/>
+          </a:prstGeom>
+          <a:noFill/>
+        </p:spPr>
+        <p:txBody>
+          <a:bodyPr wrap="square" rtlCol="0">
+            <a:spAutoFit/>
+          </a:bodyPr>
+          <a:lstStyle/>
+          <a:p>
+            <a:pPr algn="ctr"/>
+            <a:r>
+              <a:rPr lang="en-US" sz="800" dirty="0">
+                <a:solidFill>
+                  <a:schemeClr val="bg2">
+                    <a:lumMod val="10000"/>
+                  </a:schemeClr>
+                </a:solidFill>
+                <a:latin typeface="Aptos" panose="020B0004020202020204" pitchFamily="34" charset="0"/>
+              </a:rPr>
+              <a:t>tp [mm/24h]</a:t>
+            </a:r>
+            <a:endParaRPr lang="en-GB" sz="800" dirty="0">
+              <a:solidFill>
+                <a:schemeClr val="bg2">
+                  <a:lumMod val="10000"/>
+                </a:schemeClr>
+              </a:solidFill>
+              <a:latin typeface="Aptos" panose="020B0004020202020204" pitchFamily="34" charset="0"/>
+            </a:endParaRPr>
+          </a:p>
+        </p:txBody>
+      </p:sp>
+      <p:sp>
+        <p:nvSpPr>
+          <p:cNvPr id="6" name="TextBox 5">
+            <a:extLst>
+              <a:ext uri="{FF2B5EF4-FFF2-40B4-BE49-F238E27FC236}">
+                <a16:creationId xmlns:a16="http://schemas.microsoft.com/office/drawing/2014/main" id="{6A6A7F64-F7EB-8B6D-44C7-520307EB361D}"/>
+              </a:ext>
+            </a:extLst>
+          </p:cNvPr>
+          <p:cNvSpPr txBox="1"/>
+          <p:nvPr/>
+        </p:nvSpPr>
+        <p:spPr>
+          <a:xfrm>
+            <a:off x="3882550" y="6104422"/>
+            <a:ext cx="2951958" cy="215444"/>
+          </a:xfrm>
+          <a:prstGeom prst="rect">
+            <a:avLst/>
+          </a:prstGeom>
+          <a:noFill/>
+        </p:spPr>
+        <p:txBody>
+          <a:bodyPr wrap="square" rtlCol="0">
+            <a:spAutoFit/>
+          </a:bodyPr>
+          <a:lstStyle/>
+          <a:p>
+            <a:pPr algn="ctr"/>
+            <a:r>
+              <a:rPr lang="en-US" sz="800" dirty="0">
+                <a:solidFill>
+                  <a:schemeClr val="bg2">
+                    <a:lumMod val="10000"/>
+                  </a:schemeClr>
+                </a:solidFill>
+                <a:latin typeface="Aptos" panose="020B0004020202020204" pitchFamily="34" charset="0"/>
+              </a:rPr>
+              <a:t>tp [mm/24h]</a:t>
+            </a:r>
+            <a:endParaRPr lang="en-GB" sz="800" dirty="0">
+              <a:solidFill>
+                <a:schemeClr val="bg2">
+                  <a:lumMod val="10000"/>
+                </a:schemeClr>
+              </a:solidFill>
+              <a:latin typeface="Aptos" panose="020B0004020202020204" pitchFamily="34" charset="0"/>
+            </a:endParaRPr>
+          </a:p>
+        </p:txBody>
+      </p:sp>
+      <p:sp>
+        <p:nvSpPr>
+          <p:cNvPr id="14" name="TextBox 13">
+            <a:extLst>
+              <a:ext uri="{FF2B5EF4-FFF2-40B4-BE49-F238E27FC236}">
+                <a16:creationId xmlns:a16="http://schemas.microsoft.com/office/drawing/2014/main" id="{9F4E2625-1561-2C3B-DCD2-DE629ADF6E13}"/>
+              </a:ext>
+            </a:extLst>
+          </p:cNvPr>
+          <p:cNvSpPr txBox="1"/>
+          <p:nvPr/>
+        </p:nvSpPr>
+        <p:spPr>
+          <a:xfrm rot="16200000">
+            <a:off x="-938392" y="1925236"/>
+            <a:ext cx="2110597" cy="215444"/>
+          </a:xfrm>
+          <a:prstGeom prst="rect">
+            <a:avLst/>
+          </a:prstGeom>
+          <a:noFill/>
+        </p:spPr>
+        <p:txBody>
+          <a:bodyPr wrap="square" rtlCol="0">
+            <a:spAutoFit/>
+          </a:bodyPr>
+          <a:lstStyle/>
+          <a:p>
+            <a:pPr algn="ctr"/>
+            <a:r>
+              <a:rPr lang="en-US" sz="800" dirty="0">
+                <a:solidFill>
+                  <a:schemeClr val="bg2">
+                    <a:lumMod val="10000"/>
+                  </a:schemeClr>
+                </a:solidFill>
+                <a:latin typeface="Aptos" panose="020B0004020202020204" pitchFamily="34" charset="0"/>
+              </a:rPr>
+              <a:t>Percentiles [%]</a:t>
+            </a:r>
+            <a:endParaRPr lang="en-GB" sz="800" dirty="0">
+              <a:solidFill>
+                <a:schemeClr val="bg2">
+                  <a:lumMod val="10000"/>
+                </a:schemeClr>
+              </a:solidFill>
+              <a:latin typeface="Aptos" panose="020B0004020202020204" pitchFamily="34" charset="0"/>
+            </a:endParaRPr>
+          </a:p>
+        </p:txBody>
+      </p:sp>
+      <p:sp>
+        <p:nvSpPr>
+          <p:cNvPr id="15" name="TextBox 14">
+            <a:extLst>
+              <a:ext uri="{FF2B5EF4-FFF2-40B4-BE49-F238E27FC236}">
+                <a16:creationId xmlns:a16="http://schemas.microsoft.com/office/drawing/2014/main" id="{30759621-3477-5B18-711F-0C7E5B3202DF}"/>
+              </a:ext>
+            </a:extLst>
+          </p:cNvPr>
+          <p:cNvSpPr txBox="1"/>
+          <p:nvPr/>
+        </p:nvSpPr>
+        <p:spPr>
+          <a:xfrm rot="16200000">
+            <a:off x="2554790" y="1925236"/>
+            <a:ext cx="2110598" cy="215444"/>
+          </a:xfrm>
+          <a:prstGeom prst="rect">
+            <a:avLst/>
+          </a:prstGeom>
+          <a:noFill/>
+        </p:spPr>
+        <p:txBody>
+          <a:bodyPr wrap="square" rtlCol="0">
+            <a:spAutoFit/>
+          </a:bodyPr>
+          <a:lstStyle/>
+          <a:p>
+            <a:pPr algn="ctr"/>
+            <a:r>
+              <a:rPr lang="en-US" sz="800" dirty="0">
+                <a:solidFill>
+                  <a:schemeClr val="bg2">
+                    <a:lumMod val="10000"/>
+                  </a:schemeClr>
+                </a:solidFill>
+                <a:latin typeface="Aptos" panose="020B0004020202020204" pitchFamily="34" charset="0"/>
+              </a:rPr>
+              <a:t>Percentiles [%]</a:t>
+            </a:r>
+            <a:endParaRPr lang="en-GB" sz="800" dirty="0">
+              <a:solidFill>
+                <a:schemeClr val="bg2">
+                  <a:lumMod val="10000"/>
+                </a:schemeClr>
+              </a:solidFill>
+              <a:latin typeface="Aptos" panose="020B0004020202020204" pitchFamily="34" charset="0"/>
+            </a:endParaRPr>
+          </a:p>
+        </p:txBody>
+      </p:sp>
+      <p:sp>
+        <p:nvSpPr>
+          <p:cNvPr id="16" name="TextBox 15">
+            <a:extLst>
+              <a:ext uri="{FF2B5EF4-FFF2-40B4-BE49-F238E27FC236}">
+                <a16:creationId xmlns:a16="http://schemas.microsoft.com/office/drawing/2014/main" id="{B8FDFC28-E407-D5DD-6B87-8F20A353963E}"/>
+              </a:ext>
+            </a:extLst>
+          </p:cNvPr>
+          <p:cNvSpPr txBox="1"/>
+          <p:nvPr/>
+        </p:nvSpPr>
+        <p:spPr>
+          <a:xfrm rot="16200000">
+            <a:off x="-948761" y="4837067"/>
+            <a:ext cx="2110597" cy="215444"/>
+          </a:xfrm>
+          <a:prstGeom prst="rect">
+            <a:avLst/>
+          </a:prstGeom>
+          <a:noFill/>
+        </p:spPr>
+        <p:txBody>
+          <a:bodyPr wrap="square" rtlCol="0">
+            <a:spAutoFit/>
+          </a:bodyPr>
+          <a:lstStyle/>
+          <a:p>
+            <a:pPr algn="ctr"/>
+            <a:r>
+              <a:rPr lang="en-US" sz="800" dirty="0">
+                <a:solidFill>
+                  <a:schemeClr val="bg2">
+                    <a:lumMod val="10000"/>
+                  </a:schemeClr>
+                </a:solidFill>
+                <a:latin typeface="Aptos" panose="020B0004020202020204" pitchFamily="34" charset="0"/>
+              </a:rPr>
+              <a:t>Percentiles [%]</a:t>
+            </a:r>
+            <a:endParaRPr lang="en-GB" sz="800" dirty="0">
+              <a:solidFill>
+                <a:schemeClr val="bg2">
+                  <a:lumMod val="10000"/>
+                </a:schemeClr>
+              </a:solidFill>
+              <a:latin typeface="Aptos" panose="020B0004020202020204" pitchFamily="34" charset="0"/>
+            </a:endParaRPr>
+          </a:p>
+        </p:txBody>
+      </p:sp>
+      <p:sp>
+        <p:nvSpPr>
+          <p:cNvPr id="17" name="TextBox 16">
+            <a:extLst>
+              <a:ext uri="{FF2B5EF4-FFF2-40B4-BE49-F238E27FC236}">
+                <a16:creationId xmlns:a16="http://schemas.microsoft.com/office/drawing/2014/main" id="{6BBD607F-DACD-5A35-3323-892FB32059E4}"/>
+              </a:ext>
+            </a:extLst>
+          </p:cNvPr>
+          <p:cNvSpPr txBox="1"/>
+          <p:nvPr/>
+        </p:nvSpPr>
+        <p:spPr>
+          <a:xfrm rot="16200000">
+            <a:off x="2544421" y="4837067"/>
+            <a:ext cx="2110598" cy="215444"/>
+          </a:xfrm>
+          <a:prstGeom prst="rect">
+            <a:avLst/>
+          </a:prstGeom>
+          <a:noFill/>
+        </p:spPr>
+        <p:txBody>
+          <a:bodyPr wrap="square" rtlCol="0">
+            <a:spAutoFit/>
+          </a:bodyPr>
+          <a:lstStyle/>
+          <a:p>
+            <a:pPr algn="ctr"/>
+            <a:r>
+              <a:rPr lang="en-US" sz="800" dirty="0">
+                <a:solidFill>
+                  <a:schemeClr val="bg2">
+                    <a:lumMod val="10000"/>
+                  </a:schemeClr>
+                </a:solidFill>
+                <a:latin typeface="Aptos" panose="020B0004020202020204" pitchFamily="34" charset="0"/>
+              </a:rPr>
+              <a:t>Percentiles [%]</a:t>
+            </a:r>
+            <a:endParaRPr lang="en-GB" sz="800" dirty="0">
+              <a:solidFill>
+                <a:schemeClr val="bg2">
+                  <a:lumMod val="10000"/>
+                </a:schemeClr>
+              </a:solidFill>
+              <a:latin typeface="Aptos" panose="020B0004020202020204" pitchFamily="34" charset="0"/>
+            </a:endParaRPr>
+          </a:p>
+        </p:txBody>
+      </p:sp>
+      <p:sp>
+        <p:nvSpPr>
+          <p:cNvPr id="22" name="Rectangle 21">
+            <a:extLst>
+              <a:ext uri="{FF2B5EF4-FFF2-40B4-BE49-F238E27FC236}">
+                <a16:creationId xmlns:a16="http://schemas.microsoft.com/office/drawing/2014/main" id="{07E9630E-1E4A-68C5-5585-8396C140FCEF}"/>
+              </a:ext>
+            </a:extLst>
+          </p:cNvPr>
+          <p:cNvSpPr/>
+          <p:nvPr/>
+        </p:nvSpPr>
+        <p:spPr>
+          <a:xfrm>
+            <a:off x="939152" y="1368876"/>
+            <a:ext cx="2292879" cy="1653429"/>
+          </a:xfrm>
+          <a:prstGeom prst="rect">
+            <a:avLst/>
+          </a:prstGeom>
+          <a:solidFill>
+            <a:schemeClr val="bg1"/>
+          </a:solidFill>
+          <a:ln w="3175">
+            <a:solidFill>
+              <a:schemeClr val="bg2">
+                <a:lumMod val="50000"/>
+              </a:schemeClr>
+            </a:solidFill>
+          </a:ln>
+        </p:spPr>
+        <p:style>
+          <a:lnRef idx="2">
+            <a:schemeClr val="accent1">
+              <a:shade val="15000"/>
+            </a:schemeClr>
+          </a:lnRef>
+          <a:fillRef idx="1">
+            <a:schemeClr val="accent1"/>
+          </a:fillRef>
+          <a:effectRef idx="0">
+            <a:schemeClr val="accent1"/>
+          </a:effectRef>
+          <a:fontRef idx="minor">
+            <a:schemeClr val="lt1"/>
+          </a:fontRef>
+        </p:style>
+        <p:txBody>
+          <a:bodyPr rtlCol="0" anchor="ctr"/>
+          <a:lstStyle/>
+          <a:p>
+            <a:pPr algn="ctr"/>
+            <a:endParaRPr lang="en-GB"/>
+          </a:p>
+        </p:txBody>
+      </p:sp>
+      <p:sp>
+        <p:nvSpPr>
+          <p:cNvPr id="8" name="TextBox 7">
+            <a:extLst>
+              <a:ext uri="{FF2B5EF4-FFF2-40B4-BE49-F238E27FC236}">
+                <a16:creationId xmlns:a16="http://schemas.microsoft.com/office/drawing/2014/main" id="{BE642F91-41AB-927B-EF50-48E1023EBA61}"/>
+              </a:ext>
+            </a:extLst>
+          </p:cNvPr>
+          <p:cNvSpPr txBox="1"/>
+          <p:nvPr/>
+        </p:nvSpPr>
+        <p:spPr>
+          <a:xfrm>
+            <a:off x="1247954" y="2869521"/>
+            <a:ext cx="1933257" cy="184666"/>
+          </a:xfrm>
+          <a:prstGeom prst="rect">
+            <a:avLst/>
+          </a:prstGeom>
+          <a:noFill/>
+        </p:spPr>
+        <p:txBody>
+          <a:bodyPr wrap="square" rtlCol="0">
+            <a:spAutoFit/>
+          </a:bodyPr>
+          <a:lstStyle/>
+          <a:p>
+            <a:pPr algn="ctr"/>
+            <a:r>
+              <a:rPr lang="en-US" sz="600" dirty="0">
+                <a:solidFill>
+                  <a:schemeClr val="bg2">
+                    <a:lumMod val="10000"/>
+                  </a:schemeClr>
+                </a:solidFill>
+                <a:latin typeface="Aptos" panose="020B0004020202020204" pitchFamily="34" charset="0"/>
+              </a:rPr>
+              <a:t>tp [mm/24h]</a:t>
+            </a:r>
+            <a:endParaRPr lang="en-GB" sz="600" dirty="0">
+              <a:solidFill>
+                <a:schemeClr val="bg2">
+                  <a:lumMod val="10000"/>
+                </a:schemeClr>
+              </a:solidFill>
+              <a:latin typeface="Aptos" panose="020B0004020202020204" pitchFamily="34" charset="0"/>
+            </a:endParaRPr>
+          </a:p>
+        </p:txBody>
+      </p:sp>
+      <p:sp>
+        <p:nvSpPr>
+          <p:cNvPr id="18" name="TextBox 17">
+            <a:extLst>
+              <a:ext uri="{FF2B5EF4-FFF2-40B4-BE49-F238E27FC236}">
+                <a16:creationId xmlns:a16="http://schemas.microsoft.com/office/drawing/2014/main" id="{BC523E81-E5EC-A949-C1BC-0F252AD3C865}"/>
+              </a:ext>
+            </a:extLst>
+          </p:cNvPr>
+          <p:cNvSpPr txBox="1"/>
+          <p:nvPr/>
+        </p:nvSpPr>
+        <p:spPr>
+          <a:xfrm rot="16200000">
+            <a:off x="319335" y="2039355"/>
+            <a:ext cx="1475666" cy="184666"/>
+          </a:xfrm>
+          <a:prstGeom prst="rect">
+            <a:avLst/>
+          </a:prstGeom>
+          <a:noFill/>
+        </p:spPr>
+        <p:txBody>
+          <a:bodyPr wrap="square" rtlCol="0">
+            <a:spAutoFit/>
+          </a:bodyPr>
+          <a:lstStyle/>
+          <a:p>
+            <a:pPr algn="ctr"/>
+            <a:r>
+              <a:rPr lang="en-US" sz="600" dirty="0">
+                <a:solidFill>
+                  <a:schemeClr val="bg2">
+                    <a:lumMod val="10000"/>
+                  </a:schemeClr>
+                </a:solidFill>
+                <a:latin typeface="Aptos" panose="020B0004020202020204" pitchFamily="34" charset="0"/>
+              </a:rPr>
+              <a:t>Percentiles [%]</a:t>
+            </a:r>
+            <a:endParaRPr lang="en-GB" sz="600" dirty="0">
+              <a:solidFill>
+                <a:schemeClr val="bg2">
+                  <a:lumMod val="10000"/>
+                </a:schemeClr>
+              </a:solidFill>
+              <a:latin typeface="Aptos" panose="020B0004020202020204" pitchFamily="34" charset="0"/>
+            </a:endParaRPr>
+          </a:p>
+        </p:txBody>
+      </p:sp>
+      <p:pic>
+        <p:nvPicPr>
+          <p:cNvPr id="7" name="Picture 6" descr="A graph of a rainfall&#10;&#10;Description automatically generated with medium confidence">
+            <a:extLst>
+              <a:ext uri="{FF2B5EF4-FFF2-40B4-BE49-F238E27FC236}">
+                <a16:creationId xmlns:a16="http://schemas.microsoft.com/office/drawing/2014/main" id="{7F903BC0-5596-6FFC-9D17-B32FBDF4B485}"/>
+              </a:ext>
+            </a:extLst>
+          </p:cNvPr>
+          <p:cNvPicPr>
+            <a:picLocks noChangeAspect="1"/>
+          </p:cNvPicPr>
+          <p:nvPr/>
+        </p:nvPicPr>
+        <p:blipFill rotWithShape="1">
+          <a:blip r:embed="rId6">
+            <a:extLst>
+              <a:ext uri="{28A0092B-C50C-407E-A947-70E740481C1C}">
+                <a14:useLocalDpi xmlns:a14="http://schemas.microsoft.com/office/drawing/2010/main" val="0"/>
+              </a:ext>
+            </a:extLst>
+          </a:blip>
+          <a:srcRect l="6200" t="9853" r="7593" b="5234"/>
+          <a:stretch/>
+        </p:blipFill>
+        <p:spPr>
+          <a:xfrm>
+            <a:off x="1115684" y="1393855"/>
+            <a:ext cx="2065528" cy="1525950"/>
+          </a:xfrm>
+          <a:prstGeom prst="rect">
+            <a:avLst/>
+          </a:prstGeom>
+        </p:spPr>
+      </p:pic>
+      <p:sp>
+        <p:nvSpPr>
+          <p:cNvPr id="23" name="Rectangle 22">
+            <a:extLst>
+              <a:ext uri="{FF2B5EF4-FFF2-40B4-BE49-F238E27FC236}">
+                <a16:creationId xmlns:a16="http://schemas.microsoft.com/office/drawing/2014/main" id="{0CA2B182-F1A9-EB58-A305-8097A5A5DECB}"/>
+              </a:ext>
+            </a:extLst>
+          </p:cNvPr>
+          <p:cNvSpPr/>
+          <p:nvPr/>
+        </p:nvSpPr>
+        <p:spPr>
+          <a:xfrm>
+            <a:off x="4518415" y="1374972"/>
+            <a:ext cx="2213078" cy="1653429"/>
+          </a:xfrm>
+          <a:prstGeom prst="rect">
+            <a:avLst/>
+          </a:prstGeom>
+          <a:solidFill>
+            <a:schemeClr val="bg1"/>
+          </a:solidFill>
+          <a:ln w="3175">
+            <a:solidFill>
+              <a:schemeClr val="bg2">
+                <a:lumMod val="50000"/>
+              </a:schemeClr>
+            </a:solidFill>
+          </a:ln>
+        </p:spPr>
+        <p:style>
+          <a:lnRef idx="2">
+            <a:schemeClr val="accent1">
+              <a:shade val="15000"/>
+            </a:schemeClr>
+          </a:lnRef>
+          <a:fillRef idx="1">
+            <a:schemeClr val="accent1"/>
+          </a:fillRef>
+          <a:effectRef idx="0">
+            <a:schemeClr val="accent1"/>
+          </a:effectRef>
+          <a:fontRef idx="minor">
+            <a:schemeClr val="lt1"/>
+          </a:fontRef>
+        </p:style>
+        <p:txBody>
+          <a:bodyPr rtlCol="0" anchor="ctr"/>
+          <a:lstStyle/>
+          <a:p>
+            <a:pPr algn="ctr"/>
+            <a:endParaRPr lang="en-GB"/>
+          </a:p>
+        </p:txBody>
+      </p:sp>
       <p:pic>
         <p:nvPicPr>
           <p:cNvPr id="11" name="Picture 10" descr="A graph of a waterfall&#10;&#10;Description automatically generated with medium confidence">
@@ -4406,7 +5382,498 @@
           </p:cNvPicPr>
           <p:nvPr/>
         </p:nvPicPr>
-        <p:blipFill>
+        <p:blipFill rotWithShape="1">
+          <a:blip r:embed="rId7">
+            <a:extLst>
+              <a:ext uri="{28A0092B-C50C-407E-A947-70E740481C1C}">
+                <a14:useLocalDpi xmlns:a14="http://schemas.microsoft.com/office/drawing/2010/main" val="0"/>
+              </a:ext>
+            </a:extLst>
+          </a:blip>
+          <a:srcRect l="6525" t="11021" r="7201" b="5166"/>
+          <a:stretch/>
+        </p:blipFill>
+        <p:spPr>
+          <a:xfrm>
+            <a:off x="4621079" y="1419246"/>
+            <a:ext cx="2094332" cy="1525950"/>
+          </a:xfrm>
+          <a:prstGeom prst="rect">
+            <a:avLst/>
+          </a:prstGeom>
+        </p:spPr>
+      </p:pic>
+      <p:sp>
+        <p:nvSpPr>
+          <p:cNvPr id="10" name="TextBox 9">
+            <a:extLst>
+              <a:ext uri="{FF2B5EF4-FFF2-40B4-BE49-F238E27FC236}">
+                <a16:creationId xmlns:a16="http://schemas.microsoft.com/office/drawing/2014/main" id="{778F6435-EB47-CA5B-0096-795D1557F15F}"/>
+              </a:ext>
+            </a:extLst>
+          </p:cNvPr>
+          <p:cNvSpPr txBox="1"/>
+          <p:nvPr/>
+        </p:nvSpPr>
+        <p:spPr>
+          <a:xfrm>
+            <a:off x="4776355" y="2887900"/>
+            <a:ext cx="1869056" cy="184666"/>
+          </a:xfrm>
+          <a:prstGeom prst="rect">
+            <a:avLst/>
+          </a:prstGeom>
+          <a:noFill/>
+        </p:spPr>
+        <p:txBody>
+          <a:bodyPr wrap="square" rtlCol="0">
+            <a:spAutoFit/>
+          </a:bodyPr>
+          <a:lstStyle/>
+          <a:p>
+            <a:pPr algn="ctr"/>
+            <a:r>
+              <a:rPr lang="en-US" sz="600" dirty="0">
+                <a:solidFill>
+                  <a:schemeClr val="bg2">
+                    <a:lumMod val="10000"/>
+                  </a:schemeClr>
+                </a:solidFill>
+                <a:latin typeface="Aptos" panose="020B0004020202020204" pitchFamily="34" charset="0"/>
+              </a:rPr>
+              <a:t>tp [mm/24h]</a:t>
+            </a:r>
+            <a:endParaRPr lang="en-GB" sz="600" dirty="0">
+              <a:solidFill>
+                <a:schemeClr val="bg2">
+                  <a:lumMod val="10000"/>
+                </a:schemeClr>
+              </a:solidFill>
+              <a:latin typeface="Aptos" panose="020B0004020202020204" pitchFamily="34" charset="0"/>
+            </a:endParaRPr>
+          </a:p>
+        </p:txBody>
+      </p:sp>
+      <p:sp>
+        <p:nvSpPr>
+          <p:cNvPr id="19" name="TextBox 18">
+            <a:extLst>
+              <a:ext uri="{FF2B5EF4-FFF2-40B4-BE49-F238E27FC236}">
+                <a16:creationId xmlns:a16="http://schemas.microsoft.com/office/drawing/2014/main" id="{B82656F1-DB4F-0344-B084-D416B5CA6227}"/>
+              </a:ext>
+            </a:extLst>
+          </p:cNvPr>
+          <p:cNvSpPr txBox="1"/>
+          <p:nvPr/>
+        </p:nvSpPr>
+        <p:spPr>
+          <a:xfrm rot="16200000">
+            <a:off x="3903383" y="2058283"/>
+            <a:ext cx="1380224" cy="184666"/>
+          </a:xfrm>
+          <a:prstGeom prst="rect">
+            <a:avLst/>
+          </a:prstGeom>
+          <a:noFill/>
+        </p:spPr>
+        <p:txBody>
+          <a:bodyPr wrap="square" rtlCol="0">
+            <a:spAutoFit/>
+          </a:bodyPr>
+          <a:lstStyle/>
+          <a:p>
+            <a:pPr algn="ctr"/>
+            <a:r>
+              <a:rPr lang="en-US" sz="600" dirty="0">
+                <a:solidFill>
+                  <a:schemeClr val="bg2">
+                    <a:lumMod val="10000"/>
+                  </a:schemeClr>
+                </a:solidFill>
+                <a:latin typeface="Aptos" panose="020B0004020202020204" pitchFamily="34" charset="0"/>
+              </a:rPr>
+              <a:t>Percentiles [%]</a:t>
+            </a:r>
+            <a:endParaRPr lang="en-GB" sz="600" dirty="0">
+              <a:solidFill>
+                <a:schemeClr val="bg2">
+                  <a:lumMod val="10000"/>
+                </a:schemeClr>
+              </a:solidFill>
+              <a:latin typeface="Aptos" panose="020B0004020202020204" pitchFamily="34" charset="0"/>
+            </a:endParaRPr>
+          </a:p>
+        </p:txBody>
+      </p:sp>
+      <p:sp>
+        <p:nvSpPr>
+          <p:cNvPr id="25" name="Rectangle 24">
+            <a:extLst>
+              <a:ext uri="{FF2B5EF4-FFF2-40B4-BE49-F238E27FC236}">
+                <a16:creationId xmlns:a16="http://schemas.microsoft.com/office/drawing/2014/main" id="{B4891179-FC5C-D938-5E56-DB30EC1EC9D7}"/>
+              </a:ext>
+            </a:extLst>
+          </p:cNvPr>
+          <p:cNvSpPr/>
+          <p:nvPr/>
+        </p:nvSpPr>
+        <p:spPr>
+          <a:xfrm>
+            <a:off x="1112692" y="4272611"/>
+            <a:ext cx="2213078" cy="1667773"/>
+          </a:xfrm>
+          <a:prstGeom prst="rect">
+            <a:avLst/>
+          </a:prstGeom>
+          <a:solidFill>
+            <a:schemeClr val="bg1"/>
+          </a:solidFill>
+          <a:ln w="3175">
+            <a:solidFill>
+              <a:schemeClr val="bg2">
+                <a:lumMod val="50000"/>
+              </a:schemeClr>
+            </a:solidFill>
+          </a:ln>
+        </p:spPr>
+        <p:style>
+          <a:lnRef idx="2">
+            <a:schemeClr val="accent1">
+              <a:shade val="15000"/>
+            </a:schemeClr>
+          </a:lnRef>
+          <a:fillRef idx="1">
+            <a:schemeClr val="accent1"/>
+          </a:fillRef>
+          <a:effectRef idx="0">
+            <a:schemeClr val="accent1"/>
+          </a:effectRef>
+          <a:fontRef idx="minor">
+            <a:schemeClr val="lt1"/>
+          </a:fontRef>
+        </p:style>
+        <p:txBody>
+          <a:bodyPr rtlCol="0" anchor="ctr"/>
+          <a:lstStyle/>
+          <a:p>
+            <a:pPr algn="ctr"/>
+            <a:endParaRPr lang="en-GB"/>
+          </a:p>
+        </p:txBody>
+      </p:sp>
+      <p:sp>
+        <p:nvSpPr>
+          <p:cNvPr id="26" name="TextBox 25">
+            <a:extLst>
+              <a:ext uri="{FF2B5EF4-FFF2-40B4-BE49-F238E27FC236}">
+                <a16:creationId xmlns:a16="http://schemas.microsoft.com/office/drawing/2014/main" id="{E410AEEC-2D65-D54F-BAEF-5C49AEEE50FE}"/>
+              </a:ext>
+            </a:extLst>
+          </p:cNvPr>
+          <p:cNvSpPr txBox="1"/>
+          <p:nvPr/>
+        </p:nvSpPr>
+        <p:spPr>
+          <a:xfrm>
+            <a:off x="1333158" y="5772647"/>
+            <a:ext cx="1933257" cy="184666"/>
+          </a:xfrm>
+          <a:prstGeom prst="rect">
+            <a:avLst/>
+          </a:prstGeom>
+          <a:noFill/>
+        </p:spPr>
+        <p:txBody>
+          <a:bodyPr wrap="square" rtlCol="0">
+            <a:spAutoFit/>
+          </a:bodyPr>
+          <a:lstStyle/>
+          <a:p>
+            <a:pPr algn="ctr"/>
+            <a:r>
+              <a:rPr lang="en-US" sz="600" dirty="0">
+                <a:solidFill>
+                  <a:schemeClr val="bg2">
+                    <a:lumMod val="10000"/>
+                  </a:schemeClr>
+                </a:solidFill>
+                <a:latin typeface="Aptos" panose="020B0004020202020204" pitchFamily="34" charset="0"/>
+              </a:rPr>
+              <a:t>tp [mm/24h]</a:t>
+            </a:r>
+            <a:endParaRPr lang="en-GB" sz="600" dirty="0">
+              <a:solidFill>
+                <a:schemeClr val="bg2">
+                  <a:lumMod val="10000"/>
+                </a:schemeClr>
+              </a:solidFill>
+              <a:latin typeface="Aptos" panose="020B0004020202020204" pitchFamily="34" charset="0"/>
+            </a:endParaRPr>
+          </a:p>
+        </p:txBody>
+      </p:sp>
+      <p:sp>
+        <p:nvSpPr>
+          <p:cNvPr id="27" name="TextBox 26">
+            <a:extLst>
+              <a:ext uri="{FF2B5EF4-FFF2-40B4-BE49-F238E27FC236}">
+                <a16:creationId xmlns:a16="http://schemas.microsoft.com/office/drawing/2014/main" id="{81B45D24-4A67-3E7C-6EF7-08BCAD5FEE72}"/>
+              </a:ext>
+            </a:extLst>
+          </p:cNvPr>
+          <p:cNvSpPr txBox="1"/>
+          <p:nvPr/>
+        </p:nvSpPr>
+        <p:spPr>
+          <a:xfrm rot="16200000">
+            <a:off x="483036" y="4976304"/>
+            <a:ext cx="1408020" cy="184666"/>
+          </a:xfrm>
+          <a:prstGeom prst="rect">
+            <a:avLst/>
+          </a:prstGeom>
+          <a:noFill/>
+        </p:spPr>
+        <p:txBody>
+          <a:bodyPr wrap="square" rtlCol="0">
+            <a:spAutoFit/>
+          </a:bodyPr>
+          <a:lstStyle/>
+          <a:p>
+            <a:pPr algn="ctr"/>
+            <a:r>
+              <a:rPr lang="en-US" sz="600" dirty="0">
+                <a:solidFill>
+                  <a:schemeClr val="bg2">
+                    <a:lumMod val="10000"/>
+                  </a:schemeClr>
+                </a:solidFill>
+                <a:latin typeface="Aptos" panose="020B0004020202020204" pitchFamily="34" charset="0"/>
+              </a:rPr>
+              <a:t>Percentiles [%]</a:t>
+            </a:r>
+            <a:endParaRPr lang="en-GB" sz="600" dirty="0">
+              <a:solidFill>
+                <a:schemeClr val="bg2">
+                  <a:lumMod val="10000"/>
+                </a:schemeClr>
+              </a:solidFill>
+              <a:latin typeface="Aptos" panose="020B0004020202020204" pitchFamily="34" charset="0"/>
+            </a:endParaRPr>
+          </a:p>
+        </p:txBody>
+      </p:sp>
+      <p:pic>
+        <p:nvPicPr>
+          <p:cNvPr id="28" name="Picture 27" descr="A graph of different colored lines&#10;&#10;Description automatically generated">
+            <a:extLst>
+              <a:ext uri="{FF2B5EF4-FFF2-40B4-BE49-F238E27FC236}">
+                <a16:creationId xmlns:a16="http://schemas.microsoft.com/office/drawing/2014/main" id="{8A29DF26-A7AD-2B94-05D3-856FFC328DED}"/>
+              </a:ext>
+            </a:extLst>
+          </p:cNvPr>
+          <p:cNvPicPr>
+            <a:picLocks noChangeAspect="1"/>
+          </p:cNvPicPr>
+          <p:nvPr/>
+        </p:nvPicPr>
+        <p:blipFill rotWithShape="1">
+          <a:blip r:embed="rId8">
+            <a:extLst>
+              <a:ext uri="{28A0092B-C50C-407E-A947-70E740481C1C}">
+                <a14:useLocalDpi xmlns:a14="http://schemas.microsoft.com/office/drawing/2010/main" val="0"/>
+              </a:ext>
+            </a:extLst>
+          </a:blip>
+          <a:srcRect l="6849" t="10557" r="6914" b="6579"/>
+          <a:stretch/>
+        </p:blipFill>
+        <p:spPr>
+          <a:xfrm>
+            <a:off x="1243254" y="4315003"/>
+            <a:ext cx="2082516" cy="1500840"/>
+          </a:xfrm>
+          <a:prstGeom prst="rect">
+            <a:avLst/>
+          </a:prstGeom>
+          <a:ln w="3175">
+            <a:noFill/>
+          </a:ln>
+        </p:spPr>
+      </p:pic>
+      <p:sp>
+        <p:nvSpPr>
+          <p:cNvPr id="34" name="Rectangle 33">
+            <a:extLst>
+              <a:ext uri="{FF2B5EF4-FFF2-40B4-BE49-F238E27FC236}">
+                <a16:creationId xmlns:a16="http://schemas.microsoft.com/office/drawing/2014/main" id="{71361E76-A983-9896-8058-886679C5D191}"/>
+              </a:ext>
+            </a:extLst>
+          </p:cNvPr>
+          <p:cNvSpPr/>
+          <p:nvPr/>
+        </p:nvSpPr>
+        <p:spPr>
+          <a:xfrm>
+            <a:off x="4399141" y="4177336"/>
+            <a:ext cx="2213078" cy="1667773"/>
+          </a:xfrm>
+          <a:prstGeom prst="rect">
+            <a:avLst/>
+          </a:prstGeom>
+          <a:solidFill>
+            <a:schemeClr val="bg1"/>
+          </a:solidFill>
+          <a:ln w="3175">
+            <a:solidFill>
+              <a:schemeClr val="bg2">
+                <a:lumMod val="50000"/>
+              </a:schemeClr>
+            </a:solidFill>
+          </a:ln>
+        </p:spPr>
+        <p:style>
+          <a:lnRef idx="2">
+            <a:schemeClr val="accent1">
+              <a:shade val="15000"/>
+            </a:schemeClr>
+          </a:lnRef>
+          <a:fillRef idx="1">
+            <a:schemeClr val="accent1"/>
+          </a:fillRef>
+          <a:effectRef idx="0">
+            <a:schemeClr val="accent1"/>
+          </a:effectRef>
+          <a:fontRef idx="minor">
+            <a:schemeClr val="lt1"/>
+          </a:fontRef>
+        </p:style>
+        <p:txBody>
+          <a:bodyPr rtlCol="0" anchor="ctr"/>
+          <a:lstStyle/>
+          <a:p>
+            <a:pPr algn="ctr"/>
+            <a:endParaRPr lang="en-GB"/>
+          </a:p>
+        </p:txBody>
+      </p:sp>
+      <p:sp>
+        <p:nvSpPr>
+          <p:cNvPr id="35" name="TextBox 34">
+            <a:extLst>
+              <a:ext uri="{FF2B5EF4-FFF2-40B4-BE49-F238E27FC236}">
+                <a16:creationId xmlns:a16="http://schemas.microsoft.com/office/drawing/2014/main" id="{12C4DF27-5A7D-5ECC-6792-E875BA82DE24}"/>
+              </a:ext>
+            </a:extLst>
+          </p:cNvPr>
+          <p:cNvSpPr txBox="1"/>
+          <p:nvPr/>
+        </p:nvSpPr>
+        <p:spPr>
+          <a:xfrm>
+            <a:off x="4681038" y="5688629"/>
+            <a:ext cx="1869056" cy="184666"/>
+          </a:xfrm>
+          <a:prstGeom prst="rect">
+            <a:avLst/>
+          </a:prstGeom>
+          <a:noFill/>
+        </p:spPr>
+        <p:txBody>
+          <a:bodyPr wrap="square" rtlCol="0">
+            <a:spAutoFit/>
+          </a:bodyPr>
+          <a:lstStyle/>
+          <a:p>
+            <a:pPr algn="ctr"/>
+            <a:r>
+              <a:rPr lang="en-US" sz="600" dirty="0">
+                <a:solidFill>
+                  <a:schemeClr val="bg2">
+                    <a:lumMod val="10000"/>
+                  </a:schemeClr>
+                </a:solidFill>
+                <a:latin typeface="Aptos" panose="020B0004020202020204" pitchFamily="34" charset="0"/>
+              </a:rPr>
+              <a:t>tp [mm/24h]</a:t>
+            </a:r>
+            <a:endParaRPr lang="en-GB" sz="600" dirty="0">
+              <a:solidFill>
+                <a:schemeClr val="bg2">
+                  <a:lumMod val="10000"/>
+                </a:schemeClr>
+              </a:solidFill>
+              <a:latin typeface="Aptos" panose="020B0004020202020204" pitchFamily="34" charset="0"/>
+            </a:endParaRPr>
+          </a:p>
+        </p:txBody>
+      </p:sp>
+      <p:sp>
+        <p:nvSpPr>
+          <p:cNvPr id="36" name="TextBox 35">
+            <a:extLst>
+              <a:ext uri="{FF2B5EF4-FFF2-40B4-BE49-F238E27FC236}">
+                <a16:creationId xmlns:a16="http://schemas.microsoft.com/office/drawing/2014/main" id="{CD62012C-A4F6-9DD2-4BE8-778BC032A994}"/>
+              </a:ext>
+            </a:extLst>
+          </p:cNvPr>
+          <p:cNvSpPr txBox="1"/>
+          <p:nvPr/>
+        </p:nvSpPr>
+        <p:spPr>
+          <a:xfrm rot="16200000">
+            <a:off x="3643760" y="4918889"/>
+            <a:ext cx="1667772" cy="184666"/>
+          </a:xfrm>
+          <a:prstGeom prst="rect">
+            <a:avLst/>
+          </a:prstGeom>
+          <a:noFill/>
+        </p:spPr>
+        <p:txBody>
+          <a:bodyPr wrap="square" rtlCol="0">
+            <a:spAutoFit/>
+          </a:bodyPr>
+          <a:lstStyle/>
+          <a:p>
+            <a:pPr algn="ctr"/>
+            <a:r>
+              <a:rPr lang="en-US" sz="600" dirty="0">
+                <a:solidFill>
+                  <a:schemeClr val="bg2">
+                    <a:lumMod val="10000"/>
+                  </a:schemeClr>
+                </a:solidFill>
+                <a:latin typeface="Aptos" panose="020B0004020202020204" pitchFamily="34" charset="0"/>
+              </a:rPr>
+              <a:t>Percentiles [%]</a:t>
+            </a:r>
+            <a:endParaRPr lang="en-GB" sz="600" dirty="0">
+              <a:solidFill>
+                <a:schemeClr val="bg2">
+                  <a:lumMod val="10000"/>
+                </a:schemeClr>
+              </a:solidFill>
+              <a:latin typeface="Aptos" panose="020B0004020202020204" pitchFamily="34" charset="0"/>
+            </a:endParaRPr>
+          </a:p>
+        </p:txBody>
+      </p:sp>
+      <p:pic>
+        <p:nvPicPr>
+          <p:cNvPr id="37" name="Picture 36" descr="A graph of a graph&#10;&#10;Description automatically generated with medium confidence">
+            <a:extLst>
+              <a:ext uri="{FF2B5EF4-FFF2-40B4-BE49-F238E27FC236}">
+                <a16:creationId xmlns:a16="http://schemas.microsoft.com/office/drawing/2014/main" id="{F8D1C17E-B765-874E-BC9B-DA6009B9A484}"/>
+              </a:ext>
+            </a:extLst>
+          </p:cNvPr>
+          <p:cNvPicPr>
+            <a:picLocks noChangeAspect="1"/>
+          </p:cNvPicPr>
+          <p:nvPr/>
+        </p:nvPicPr>
+        <p:blipFill rotWithShape="1">
           <a:blip r:embed="rId9">
             <a:extLst>
               <a:ext uri="{28A0092B-C50C-407E-A947-70E740481C1C}">
@@ -4414,17 +5881,20 @@
               </a:ext>
             </a:extLst>
           </a:blip>
-          <a:srcRect l="3408" t="11021" r="7201"/>
+          <a:srcRect l="6568" t="10556" r="6914" b="6065"/>
           <a:stretch/>
         </p:blipFill>
         <p:spPr>
           <a:xfrm>
-            <a:off x="4571085" y="1342096"/>
-            <a:ext cx="2170009" cy="1620000"/>
+            <a:off x="4520010" y="4213732"/>
+            <a:ext cx="2089300" cy="1510141"/>
           </a:xfrm>
           <a:prstGeom prst="rect">
             <a:avLst/>
           </a:prstGeom>
+          <a:ln w="3175">
+            <a:noFill/>
+          </a:ln>
         </p:spPr>
       </p:pic>
     </p:spTree>

</xml_diff>